<commit_message>
create week 6 presentation
</commit_message>
<xml_diff>
--- a/infrastructure-week-2.pptx
+++ b/infrastructure-week-2.pptx
@@ -12,8 +12,8 @@
     <p:sldId id="262" r:id="rId6"/>
     <p:sldId id="263" r:id="rId7"/>
     <p:sldId id="264" r:id="rId8"/>
-    <p:sldId id="265" r:id="rId9"/>
-    <p:sldId id="266" r:id="rId10"/>
+    <p:sldId id="266" r:id="rId9"/>
+    <p:sldId id="265" r:id="rId10"/>
     <p:sldId id="267" r:id="rId11"/>
     <p:sldId id="268" r:id="rId12"/>
     <p:sldId id="271" r:id="rId13"/>
@@ -302,7 +302,7 @@
           <a:p>
             <a:fld id="{5B60E164-4364-3441-BA83-2CF3942ACF8D}" type="datetimeFigureOut">
               <a:rPr lang="en-US" smtClean="0"/>
-              <a:t>4/4/16</a:t>
+              <a:t>4/11/16</a:t>
             </a:fld>
             <a:endParaRPr lang="en-US"/>
           </a:p>
@@ -472,7 +472,7 @@
           <a:p>
             <a:fld id="{5B60E164-4364-3441-BA83-2CF3942ACF8D}" type="datetimeFigureOut">
               <a:rPr lang="en-US" smtClean="0"/>
-              <a:t>4/4/16</a:t>
+              <a:t>4/11/16</a:t>
             </a:fld>
             <a:endParaRPr lang="en-US"/>
           </a:p>
@@ -652,7 +652,7 @@
           <a:p>
             <a:fld id="{5B60E164-4364-3441-BA83-2CF3942ACF8D}" type="datetimeFigureOut">
               <a:rPr lang="en-US" smtClean="0"/>
-              <a:t>4/4/16</a:t>
+              <a:t>4/11/16</a:t>
             </a:fld>
             <a:endParaRPr lang="en-US"/>
           </a:p>
@@ -822,7 +822,7 @@
           <a:p>
             <a:fld id="{5B60E164-4364-3441-BA83-2CF3942ACF8D}" type="datetimeFigureOut">
               <a:rPr lang="en-US" smtClean="0"/>
-              <a:t>4/4/16</a:t>
+              <a:t>4/11/16</a:t>
             </a:fld>
             <a:endParaRPr lang="en-US"/>
           </a:p>
@@ -1068,7 +1068,7 @@
           <a:p>
             <a:fld id="{5B60E164-4364-3441-BA83-2CF3942ACF8D}" type="datetimeFigureOut">
               <a:rPr lang="en-US" smtClean="0"/>
-              <a:t>4/4/16</a:t>
+              <a:t>4/11/16</a:t>
             </a:fld>
             <a:endParaRPr lang="en-US"/>
           </a:p>
@@ -1356,7 +1356,7 @@
           <a:p>
             <a:fld id="{5B60E164-4364-3441-BA83-2CF3942ACF8D}" type="datetimeFigureOut">
               <a:rPr lang="en-US" smtClean="0"/>
-              <a:t>4/4/16</a:t>
+              <a:t>4/11/16</a:t>
             </a:fld>
             <a:endParaRPr lang="en-US"/>
           </a:p>
@@ -1778,7 +1778,7 @@
           <a:p>
             <a:fld id="{5B60E164-4364-3441-BA83-2CF3942ACF8D}" type="datetimeFigureOut">
               <a:rPr lang="en-US" smtClean="0"/>
-              <a:t>4/4/16</a:t>
+              <a:t>4/11/16</a:t>
             </a:fld>
             <a:endParaRPr lang="en-US"/>
           </a:p>
@@ -1896,7 +1896,7 @@
           <a:p>
             <a:fld id="{5B60E164-4364-3441-BA83-2CF3942ACF8D}" type="datetimeFigureOut">
               <a:rPr lang="en-US" smtClean="0"/>
-              <a:t>4/4/16</a:t>
+              <a:t>4/11/16</a:t>
             </a:fld>
             <a:endParaRPr lang="en-US"/>
           </a:p>
@@ -1991,7 +1991,7 @@
           <a:p>
             <a:fld id="{5B60E164-4364-3441-BA83-2CF3942ACF8D}" type="datetimeFigureOut">
               <a:rPr lang="en-US" smtClean="0"/>
-              <a:t>4/4/16</a:t>
+              <a:t>4/11/16</a:t>
             </a:fld>
             <a:endParaRPr lang="en-US"/>
           </a:p>
@@ -2268,7 +2268,7 @@
           <a:p>
             <a:fld id="{5B60E164-4364-3441-BA83-2CF3942ACF8D}" type="datetimeFigureOut">
               <a:rPr lang="en-US" smtClean="0"/>
-              <a:t>4/4/16</a:t>
+              <a:t>4/11/16</a:t>
             </a:fld>
             <a:endParaRPr lang="en-US"/>
           </a:p>
@@ -2521,7 +2521,7 @@
           <a:p>
             <a:fld id="{5B60E164-4364-3441-BA83-2CF3942ACF8D}" type="datetimeFigureOut">
               <a:rPr lang="en-US" smtClean="0"/>
-              <a:t>4/4/16</a:t>
+              <a:t>4/11/16</a:t>
             </a:fld>
             <a:endParaRPr lang="en-US"/>
           </a:p>
@@ -2734,7 +2734,7 @@
           <a:p>
             <a:fld id="{5B60E164-4364-3441-BA83-2CF3942ACF8D}" type="datetimeFigureOut">
               <a:rPr lang="en-US" smtClean="0"/>
-              <a:t>4/4/16</a:t>
+              <a:t>4/11/16</a:t>
             </a:fld>
             <a:endParaRPr lang="en-US"/>
           </a:p>
@@ -3127,29 +3127,37 @@
         </p:spPr>
         <p:txBody>
           <a:bodyPr>
-            <a:normAutofit fontScale="90000"/>
+            <a:normAutofit/>
           </a:bodyPr>
           <a:lstStyle/>
           <a:p>
             <a:r>
-              <a:rPr lang="en-US" sz="6000" dirty="0" smtClean="0"/>
+              <a:rPr lang="en-US" sz="3600" dirty="0" err="1"/>
+              <a:t>DevOps</a:t>
+            </a:r>
+            <a:r>
+              <a:rPr lang="en-US" sz="3600" dirty="0"/>
+              <a:t> &amp; Cloud Infrastructure</a:t>
+            </a:r>
+            <a:br>
+              <a:rPr lang="en-US" sz="3600" dirty="0"/>
+            </a:br>
+            <a:r>
+              <a:rPr lang="en-US" sz="3600" dirty="0"/>
               <a:t>SEIS 6XX</a:t>
             </a:r>
             <a:br>
-              <a:rPr lang="en-US" sz="6000" dirty="0" smtClean="0"/>
+              <a:rPr lang="en-US" sz="3600" dirty="0"/>
             </a:br>
             <a:r>
-              <a:rPr lang="en-US" sz="6000" dirty="0" smtClean="0"/>
-              <a:t>IT Infrastructure</a:t>
-            </a:r>
-            <a:br>
-              <a:rPr lang="en-US" sz="6000" dirty="0" smtClean="0"/>
-            </a:br>
-            <a:r>
-              <a:rPr lang="en-US" sz="6000" dirty="0" smtClean="0"/>
-              <a:t>Week 2</a:t>
-            </a:r>
-            <a:endParaRPr lang="en-US" sz="6000" dirty="0"/>
+              <a:rPr lang="en-US" sz="3600" dirty="0"/>
+              <a:t>Week </a:t>
+            </a:r>
+            <a:r>
+              <a:rPr lang="en-US" sz="3600" dirty="0" smtClean="0"/>
+              <a:t>2</a:t>
+            </a:r>
+            <a:endParaRPr lang="en-US" sz="3600" dirty="0"/>
           </a:p>
         </p:txBody>
       </p:sp>
@@ -3207,6 +3215,30 @@
           </a:p>
         </p:txBody>
       </p:sp>
+      <p:pic>
+        <p:nvPicPr>
+          <p:cNvPr id="4" name="Picture 3"/>
+          <p:cNvPicPr>
+            <a:picLocks noChangeAspect="1"/>
+          </p:cNvPicPr>
+          <p:nvPr/>
+        </p:nvPicPr>
+        <p:blipFill>
+          <a:blip r:embed="rId2"/>
+          <a:stretch>
+            <a:fillRect/>
+          </a:stretch>
+        </p:blipFill>
+        <p:spPr>
+          <a:xfrm>
+            <a:off x="5918200" y="3274797"/>
+            <a:ext cx="2540000" cy="2540000"/>
+          </a:xfrm>
+          <a:prstGeom prst="rect">
+            <a:avLst/>
+          </a:prstGeom>
+        </p:spPr>
+      </p:pic>
     </p:spTree>
     <p:extLst>
       <p:ext uri="{BB962C8B-B14F-4D97-AF65-F5344CB8AC3E}">
@@ -3330,6 +3362,29 @@
           </a:p>
         </p:txBody>
       </p:sp>
+      <p:pic>
+        <p:nvPicPr>
+          <p:cNvPr id="4" name="Picture 3"/>
+          <p:cNvPicPr>
+            <a:picLocks noChangeAspect="1"/>
+          </p:cNvPicPr>
+          <p:nvPr/>
+        </p:nvPicPr>
+        <p:blipFill rotWithShape="1">
+          <a:blip r:embed="rId2"/>
+          <a:srcRect l="22557" t="28750" r="18881" b="25491"/>
+          <a:stretch/>
+        </p:blipFill>
+        <p:spPr>
+          <a:xfrm>
+            <a:off x="6473952" y="310896"/>
+            <a:ext cx="1673352" cy="1307592"/>
+          </a:xfrm>
+          <a:prstGeom prst="rect">
+            <a:avLst/>
+          </a:prstGeom>
+        </p:spPr>
+      </p:pic>
     </p:spTree>
     <p:extLst>
       <p:ext uri="{BB962C8B-B14F-4D97-AF65-F5344CB8AC3E}">
@@ -3499,6 +3554,30 @@
           </a:p>
         </p:txBody>
       </p:sp>
+      <p:pic>
+        <p:nvPicPr>
+          <p:cNvPr id="4" name="Picture 3"/>
+          <p:cNvPicPr>
+            <a:picLocks noChangeAspect="1"/>
+          </p:cNvPicPr>
+          <p:nvPr/>
+        </p:nvPicPr>
+        <p:blipFill>
+          <a:blip r:embed="rId4"/>
+          <a:stretch>
+            <a:fillRect/>
+          </a:stretch>
+        </p:blipFill>
+        <p:spPr>
+          <a:xfrm>
+            <a:off x="7172910" y="4605631"/>
+            <a:ext cx="1365137" cy="1365137"/>
+          </a:xfrm>
+          <a:prstGeom prst="rect">
+            <a:avLst/>
+          </a:prstGeom>
+        </p:spPr>
+      </p:pic>
     </p:spTree>
     <p:extLst>
       <p:ext uri="{BB962C8B-B14F-4D97-AF65-F5344CB8AC3E}">
@@ -3594,6 +3673,30 @@
           </a:p>
         </p:txBody>
       </p:sp>
+      <p:pic>
+        <p:nvPicPr>
+          <p:cNvPr id="4" name="Picture 3"/>
+          <p:cNvPicPr>
+            <a:picLocks noChangeAspect="1"/>
+          </p:cNvPicPr>
+          <p:nvPr/>
+        </p:nvPicPr>
+        <p:blipFill>
+          <a:blip r:embed="rId2"/>
+          <a:stretch>
+            <a:fillRect/>
+          </a:stretch>
+        </p:blipFill>
+        <p:spPr>
+          <a:xfrm>
+            <a:off x="7268698" y="403586"/>
+            <a:ext cx="1040731" cy="1040731"/>
+          </a:xfrm>
+          <a:prstGeom prst="rect">
+            <a:avLst/>
+          </a:prstGeom>
+        </p:spPr>
+      </p:pic>
     </p:spTree>
     <p:extLst>
       <p:ext uri="{BB962C8B-B14F-4D97-AF65-F5344CB8AC3E}">
@@ -3664,7 +3767,7 @@
         <p:spPr/>
         <p:txBody>
           <a:bodyPr>
-            <a:normAutofit fontScale="92500" lnSpcReduction="20000"/>
+            <a:normAutofit fontScale="77500" lnSpcReduction="20000"/>
           </a:bodyPr>
           <a:lstStyle/>
           <a:p>
@@ -3678,6 +3781,9 @@
             </a:r>
           </a:p>
           <a:p>
+            <a:endParaRPr lang="en-US" dirty="0" smtClean="0"/>
+          </a:p>
+          <a:p>
             <a:r>
               <a:rPr lang="en-US" dirty="0" err="1" smtClean="0"/>
               <a:t>Git</a:t>
@@ -3701,6 +3807,10 @@
               <a:rPr lang="en-US" dirty="0" smtClean="0"/>
               <a:t> workflow</a:t>
             </a:r>
+          </a:p>
+          <a:p>
+            <a:pPr lvl="1"/>
+            <a:endParaRPr lang="en-US" dirty="0" smtClean="0"/>
           </a:p>
           <a:p>
             <a:r>
@@ -3784,9 +3894,54 @@
           <a:chExt cx="0" cy="0"/>
         </a:xfrm>
       </p:grpSpPr>
+      <p:sp>
+        <p:nvSpPr>
+          <p:cNvPr id="5" name="TextBox 4"/>
+          <p:cNvSpPr txBox="1"/>
+          <p:nvPr/>
+        </p:nvSpPr>
+        <p:spPr>
+          <a:xfrm>
+            <a:off x="5839313" y="6313194"/>
+            <a:ext cx="3163809" cy="246221"/>
+          </a:xfrm>
+          <a:prstGeom prst="rect">
+            <a:avLst/>
+          </a:prstGeom>
+          <a:noFill/>
+        </p:spPr>
+        <p:txBody>
+          <a:bodyPr wrap="none" rtlCol="0">
+            <a:spAutoFit/>
+          </a:bodyPr>
+          <a:lstStyle/>
+          <a:p>
+            <a:r>
+              <a:rPr lang="en-US" sz="1000" dirty="0"/>
+              <a:t>http://</a:t>
+            </a:r>
+            <a:r>
+              <a:rPr lang="en-US" sz="1000" dirty="0" err="1"/>
+              <a:t>nvie.com</a:t>
+            </a:r>
+            <a:r>
+              <a:rPr lang="en-US" sz="1000" dirty="0"/>
+              <a:t>/posts/a-successful-</a:t>
+            </a:r>
+            <a:r>
+              <a:rPr lang="en-US" sz="1000" dirty="0" err="1"/>
+              <a:t>git</a:t>
+            </a:r>
+            <a:r>
+              <a:rPr lang="en-US" sz="1000" dirty="0"/>
+              <a:t>-branching-model/</a:t>
+            </a:r>
+          </a:p>
+        </p:txBody>
+      </p:sp>
       <p:pic>
         <p:nvPicPr>
-          <p:cNvPr id="4" name="Picture 3"/>
+          <p:cNvPr id="2" name="Picture 1"/>
           <p:cNvPicPr>
             <a:picLocks noChangeAspect="1"/>
           </p:cNvPicPr>
@@ -3800,59 +3955,14 @@
         </p:blipFill>
         <p:spPr>
           <a:xfrm>
-            <a:off x="1441074" y="0"/>
-            <a:ext cx="5175000" cy="6858000"/>
+            <a:off x="673100" y="1016000"/>
+            <a:ext cx="7797800" cy="4826000"/>
           </a:xfrm>
           <a:prstGeom prst="rect">
             <a:avLst/>
           </a:prstGeom>
         </p:spPr>
       </p:pic>
-      <p:sp>
-        <p:nvSpPr>
-          <p:cNvPr id="5" name="TextBox 4"/>
-          <p:cNvSpPr txBox="1"/>
-          <p:nvPr/>
-        </p:nvSpPr>
-        <p:spPr>
-          <a:xfrm>
-            <a:off x="5839313" y="6313194"/>
-            <a:ext cx="3163809" cy="246221"/>
-          </a:xfrm>
-          <a:prstGeom prst="rect">
-            <a:avLst/>
-          </a:prstGeom>
-          <a:noFill/>
-        </p:spPr>
-        <p:txBody>
-          <a:bodyPr wrap="none" rtlCol="0">
-            <a:spAutoFit/>
-          </a:bodyPr>
-          <a:lstStyle/>
-          <a:p>
-            <a:r>
-              <a:rPr lang="en-US" sz="1000" dirty="0"/>
-              <a:t>http://</a:t>
-            </a:r>
-            <a:r>
-              <a:rPr lang="en-US" sz="1000" dirty="0" err="1"/>
-              <a:t>nvie.com</a:t>
-            </a:r>
-            <a:r>
-              <a:rPr lang="en-US" sz="1000" dirty="0"/>
-              <a:t>/posts/a-successful-</a:t>
-            </a:r>
-            <a:r>
-              <a:rPr lang="en-US" sz="1000" dirty="0" err="1"/>
-              <a:t>git</a:t>
-            </a:r>
-            <a:r>
-              <a:rPr lang="en-US" sz="1000" dirty="0"/>
-              <a:t>-branching-model/</a:t>
-            </a:r>
-          </a:p>
-        </p:txBody>
-      </p:sp>
     </p:spTree>
     <p:extLst>
       <p:ext uri="{BB962C8B-B14F-4D97-AF65-F5344CB8AC3E}">
@@ -3977,6 +4087,30 @@
           </a:p>
         </p:txBody>
       </p:sp>
+      <p:pic>
+        <p:nvPicPr>
+          <p:cNvPr id="4" name="Picture 3"/>
+          <p:cNvPicPr>
+            <a:picLocks noChangeAspect="1"/>
+          </p:cNvPicPr>
+          <p:nvPr/>
+        </p:nvPicPr>
+        <p:blipFill>
+          <a:blip r:embed="rId2"/>
+          <a:stretch>
+            <a:fillRect/>
+          </a:stretch>
+        </p:blipFill>
+        <p:spPr>
+          <a:xfrm>
+            <a:off x="7267857" y="3359263"/>
+            <a:ext cx="1658320" cy="1658320"/>
+          </a:xfrm>
+          <a:prstGeom prst="rect">
+            <a:avLst/>
+          </a:prstGeom>
+        </p:spPr>
+      </p:pic>
     </p:spTree>
     <p:extLst>
       <p:ext uri="{BB962C8B-B14F-4D97-AF65-F5344CB8AC3E}">
@@ -4074,6 +4208,30 @@
           </a:p>
         </p:txBody>
       </p:sp>
+      <p:pic>
+        <p:nvPicPr>
+          <p:cNvPr id="4" name="Picture 3"/>
+          <p:cNvPicPr>
+            <a:picLocks noChangeAspect="1"/>
+          </p:cNvPicPr>
+          <p:nvPr/>
+        </p:nvPicPr>
+        <p:blipFill>
+          <a:blip r:embed="rId2"/>
+          <a:stretch>
+            <a:fillRect/>
+          </a:stretch>
+        </p:blipFill>
+        <p:spPr>
+          <a:xfrm>
+            <a:off x="5791282" y="1600200"/>
+            <a:ext cx="2641600" cy="3073400"/>
+          </a:xfrm>
+          <a:prstGeom prst="rect">
+            <a:avLst/>
+          </a:prstGeom>
+        </p:spPr>
+      </p:pic>
     </p:spTree>
     <p:extLst>
       <p:ext uri="{BB962C8B-B14F-4D97-AF65-F5344CB8AC3E}">
@@ -4121,7 +4279,7 @@
           <a:p>
             <a:r>
               <a:rPr lang="en-US" dirty="0" smtClean="0"/>
-              <a:t>Readings</a:t>
+              <a:t>Automation</a:t>
             </a:r>
             <a:endParaRPr lang="en-US" dirty="0"/>
           </a:p>
@@ -4137,10 +4295,15 @@
             <p:ph idx="1"/>
           </p:nvPr>
         </p:nvSpPr>
-        <p:spPr/>
+        <p:spPr>
+          <a:xfrm>
+            <a:off x="457200" y="1600200"/>
+            <a:ext cx="6617048" cy="4525963"/>
+          </a:xfrm>
+        </p:spPr>
         <p:txBody>
           <a:bodyPr>
-            <a:normAutofit/>
+            <a:normAutofit lnSpcReduction="10000"/>
           </a:bodyPr>
           <a:lstStyle/>
           <a:p>
@@ -4166,9 +4329,13 @@
           </a:p>
           <a:p>
             <a:pPr lvl="1"/>
-            <a:r>
-              <a:rPr lang="en-US" dirty="0" smtClean="0"/>
-              <a:t>Automation pipeline:</a:t>
+            <a:endParaRPr lang="en-US" dirty="0" smtClean="0"/>
+          </a:p>
+          <a:p>
+            <a:pPr lvl="1"/>
+            <a:r>
+              <a:rPr lang="en-US" dirty="0" smtClean="0"/>
+              <a:t>Example: Software build pipeline</a:t>
             </a:r>
           </a:p>
           <a:p>
@@ -4214,8 +4381,8 @@
         </p:blipFill>
         <p:spPr>
           <a:xfrm>
-            <a:off x="7353904" y="274638"/>
-            <a:ext cx="1118809" cy="1465316"/>
+            <a:off x="6824988" y="274637"/>
+            <a:ext cx="2172126" cy="2844857"/>
           </a:xfrm>
           <a:prstGeom prst="rect">
             <a:avLst/>
@@ -4269,7 +4436,7 @@
           <a:p>
             <a:r>
               <a:rPr lang="en-US" dirty="0" smtClean="0"/>
-              <a:t>Readings</a:t>
+              <a:t>Automation</a:t>
             </a:r>
             <a:endParaRPr lang="en-US" dirty="0"/>
           </a:p>
@@ -4366,6 +4533,30 @@
           </a:p>
         </p:txBody>
       </p:sp>
+      <p:pic>
+        <p:nvPicPr>
+          <p:cNvPr id="4" name="Picture 3"/>
+          <p:cNvPicPr>
+            <a:picLocks noChangeAspect="1"/>
+          </p:cNvPicPr>
+          <p:nvPr/>
+        </p:nvPicPr>
+        <p:blipFill>
+          <a:blip r:embed="rId2"/>
+          <a:stretch>
+            <a:fillRect/>
+          </a:stretch>
+        </p:blipFill>
+        <p:spPr>
+          <a:xfrm>
+            <a:off x="6518890" y="439195"/>
+            <a:ext cx="1781399" cy="1451801"/>
+          </a:xfrm>
+          <a:prstGeom prst="rect">
+            <a:avLst/>
+          </a:prstGeom>
+        </p:spPr>
+      </p:pic>
     </p:spTree>
     <p:extLst>
       <p:ext uri="{BB962C8B-B14F-4D97-AF65-F5344CB8AC3E}">
@@ -4413,7 +4604,7 @@
           <a:p>
             <a:r>
               <a:rPr lang="en-US" dirty="0" smtClean="0"/>
-              <a:t>Readings</a:t>
+              <a:t>Automation</a:t>
             </a:r>
             <a:endParaRPr lang="en-US" dirty="0"/>
           </a:p>
@@ -4545,7 +4736,7 @@
           <a:p>
             <a:r>
               <a:rPr lang="en-US" dirty="0" smtClean="0"/>
-              <a:t>Readings</a:t>
+              <a:t>Automation goals</a:t>
             </a:r>
             <a:endParaRPr lang="en-US" dirty="0"/>
           </a:p>
@@ -4564,15 +4755,9 @@
         <p:spPr/>
         <p:txBody>
           <a:bodyPr>
-            <a:normAutofit/>
+            <a:normAutofit fontScale="92500" lnSpcReduction="20000"/>
           </a:bodyPr>
           <a:lstStyle/>
-          <a:p>
-            <a:r>
-              <a:rPr lang="en-US" dirty="0" smtClean="0"/>
-              <a:t>Goals of automation:</a:t>
-            </a:r>
-          </a:p>
           <a:p>
             <a:pPr lvl="1"/>
             <a:r>
@@ -4586,6 +4771,10 @@
           </a:p>
           <a:p>
             <a:pPr lvl="1"/>
+            <a:endParaRPr lang="en-US" dirty="0" smtClean="0"/>
+          </a:p>
+          <a:p>
+            <a:pPr lvl="1"/>
             <a:r>
               <a:rPr lang="en-US" b="1" dirty="0" smtClean="0"/>
               <a:t>Improve accuracy/ repeatability</a:t>
@@ -4597,6 +4786,10 @@
           </a:p>
           <a:p>
             <a:pPr lvl="1"/>
+            <a:endParaRPr lang="en-US" dirty="0" smtClean="0"/>
+          </a:p>
+          <a:p>
+            <a:pPr lvl="1"/>
             <a:r>
               <a:rPr lang="en-US" b="1" dirty="0" smtClean="0"/>
               <a:t>Save time</a:t>
@@ -4608,6 +4801,10 @@
           </a:p>
           <a:p>
             <a:pPr lvl="1"/>
+            <a:endParaRPr lang="en-US" dirty="0" smtClean="0"/>
+          </a:p>
+          <a:p>
+            <a:pPr lvl="1"/>
             <a:r>
               <a:rPr lang="en-US" b="1" dirty="0" smtClean="0"/>
               <a:t>Make processes safer</a:t>
@@ -4619,6 +4816,10 @@
           </a:p>
           <a:p>
             <a:pPr lvl="1"/>
+            <a:endParaRPr lang="en-US" dirty="0" smtClean="0"/>
+          </a:p>
+          <a:p>
+            <a:pPr lvl="1"/>
             <a:r>
               <a:rPr lang="en-US" b="1" dirty="0" smtClean="0"/>
               <a:t>Empower users</a:t>
@@ -4637,6 +4838,30 @@
           </a:p>
         </p:txBody>
       </p:sp>
+      <p:pic>
+        <p:nvPicPr>
+          <p:cNvPr id="4" name="Picture 3"/>
+          <p:cNvPicPr>
+            <a:picLocks noChangeAspect="1"/>
+          </p:cNvPicPr>
+          <p:nvPr/>
+        </p:nvPicPr>
+        <p:blipFill>
+          <a:blip r:embed="rId2"/>
+          <a:stretch>
+            <a:fillRect/>
+          </a:stretch>
+        </p:blipFill>
+        <p:spPr>
+          <a:xfrm>
+            <a:off x="6963468" y="274638"/>
+            <a:ext cx="1883853" cy="1883853"/>
+          </a:xfrm>
+          <a:prstGeom prst="rect">
+            <a:avLst/>
+          </a:prstGeom>
+        </p:spPr>
+      </p:pic>
     </p:spTree>
     <p:extLst>
       <p:ext uri="{BB962C8B-B14F-4D97-AF65-F5344CB8AC3E}">
@@ -4684,7 +4909,7 @@
           <a:p>
             <a:r>
               <a:rPr lang="en-US" dirty="0" smtClean="0"/>
-              <a:t>Readings</a:t>
+              <a:t>Automation</a:t>
             </a:r>
             <a:endParaRPr lang="en-US" dirty="0"/>
           </a:p>
@@ -4801,29 +5026,6 @@
         </p:nvSpPr>
         <p:spPr/>
         <p:txBody>
-          <a:bodyPr/>
-          <a:lstStyle/>
-          <a:p>
-            <a:r>
-              <a:rPr lang="en-US" dirty="0" smtClean="0"/>
-              <a:t>Linux</a:t>
-            </a:r>
-            <a:endParaRPr lang="en-US" dirty="0"/>
-          </a:p>
-        </p:txBody>
-      </p:sp>
-      <p:sp>
-        <p:nvSpPr>
-          <p:cNvPr id="3" name="Content Placeholder 2"/>
-          <p:cNvSpPr>
-            <a:spLocks noGrp="1"/>
-          </p:cNvSpPr>
-          <p:nvPr>
-            <p:ph idx="1"/>
-          </p:nvPr>
-        </p:nvSpPr>
-        <p:spPr/>
-        <p:txBody>
           <a:bodyPr>
             <a:normAutofit/>
           </a:bodyPr>
@@ -4831,38 +5033,74 @@
           <a:p>
             <a:r>
               <a:rPr lang="en-US" dirty="0" smtClean="0"/>
-              <a:t>Why Linux? </a:t>
-            </a:r>
-          </a:p>
-          <a:p>
-            <a:pPr lvl="1"/>
-            <a:r>
-              <a:rPr lang="en-US" dirty="0" smtClean="0"/>
-              <a:t>Most common platform for modern distributed applications</a:t>
-            </a:r>
-          </a:p>
-          <a:p>
-            <a:pPr lvl="1"/>
-            <a:r>
-              <a:rPr lang="en-US" dirty="0" smtClean="0"/>
-              <a:t>Automation starts at the command line, not the GUI</a:t>
-            </a:r>
-          </a:p>
-          <a:p>
-            <a:r>
-              <a:rPr lang="en-US" dirty="0" smtClean="0"/>
-              <a:t>Caveat: It’s not possible to learn Linux in a few hours. Plan to invest meaningful time outside of class if you aren’t already familiar with it. </a:t>
-            </a:r>
-          </a:p>
-          <a:p>
-            <a:endParaRPr lang="en-US" dirty="0" smtClean="0"/>
-          </a:p>
-          <a:p>
-            <a:endParaRPr lang="en-US" dirty="0" smtClean="0"/>
-          </a:p>
-          <a:p>
-            <a:pPr lvl="1"/>
-            <a:endParaRPr lang="en-US" dirty="0" smtClean="0"/>
+              <a:t>Linux</a:t>
+            </a:r>
+            <a:endParaRPr lang="en-US" dirty="0"/>
+          </a:p>
+        </p:txBody>
+      </p:sp>
+      <p:sp>
+        <p:nvSpPr>
+          <p:cNvPr id="3" name="Content Placeholder 2"/>
+          <p:cNvSpPr>
+            <a:spLocks noGrp="1"/>
+          </p:cNvSpPr>
+          <p:nvPr>
+            <p:ph idx="1"/>
+          </p:nvPr>
+        </p:nvSpPr>
+        <p:spPr/>
+        <p:txBody>
+          <a:bodyPr>
+            <a:normAutofit lnSpcReduction="10000"/>
+          </a:bodyPr>
+          <a:lstStyle/>
+          <a:p>
+            <a:r>
+              <a:rPr lang="en-US" dirty="0" smtClean="0"/>
+              <a:t>History</a:t>
+            </a:r>
+          </a:p>
+          <a:p>
+            <a:pPr lvl="1"/>
+            <a:r>
+              <a:rPr lang="en-US" dirty="0" smtClean="0"/>
+              <a:t>Started by Linus Torvalds in 1991</a:t>
+            </a:r>
+          </a:p>
+          <a:p>
+            <a:pPr lvl="1"/>
+            <a:r>
+              <a:rPr lang="en-US" dirty="0" smtClean="0"/>
+              <a:t>Inspired by Unix, developed at AT&amp;T in 1970s</a:t>
+            </a:r>
+          </a:p>
+          <a:p>
+            <a:pPr lvl="1"/>
+            <a:r>
+              <a:rPr lang="en-US" dirty="0" smtClean="0"/>
+              <a:t>Linux is not Unix, but uses same concepts</a:t>
+            </a:r>
+          </a:p>
+          <a:p>
+            <a:pPr lvl="1"/>
+            <a:r>
+              <a:rPr lang="en-US" dirty="0" smtClean="0"/>
+              <a:t>Open Source Software (General Public License)</a:t>
+            </a:r>
+          </a:p>
+          <a:p>
+            <a:r>
+              <a:rPr lang="en-US" dirty="0" smtClean="0"/>
+              <a:t>Runs on cells phones to largest supercomputers</a:t>
+            </a:r>
+          </a:p>
+          <a:p>
+            <a:r>
+              <a:rPr lang="en-US" dirty="0" smtClean="0"/>
+              <a:t>Perfect for supporting service-based application architecture in the cloud</a:t>
+            </a:r>
+            <a:endParaRPr lang="en-US" dirty="0"/>
           </a:p>
         </p:txBody>
       </p:sp>
@@ -4882,8 +5120,8 @@
         </p:blipFill>
         <p:spPr>
           <a:xfrm>
-            <a:off x="5946751" y="274638"/>
-            <a:ext cx="1709536" cy="1983062"/>
+            <a:off x="6930759" y="432268"/>
+            <a:ext cx="1449139" cy="1686017"/>
           </a:xfrm>
           <a:prstGeom prst="rect">
             <a:avLst/>
@@ -4893,7 +5131,7 @@
     </p:spTree>
     <p:extLst>
       <p:ext uri="{BB962C8B-B14F-4D97-AF65-F5344CB8AC3E}">
-        <p14:creationId xmlns:p14="http://schemas.microsoft.com/office/powerpoint/2010/main" val="3727470488"/>
+        <p14:creationId xmlns:p14="http://schemas.microsoft.com/office/powerpoint/2010/main" val="3312454313"/>
       </p:ext>
     </p:extLst>
   </p:cSld>
@@ -4932,88 +5170,90 @@
         </p:nvSpPr>
         <p:spPr/>
         <p:txBody>
+          <a:bodyPr/>
+          <a:lstStyle/>
+          <a:p>
+            <a:r>
+              <a:rPr lang="en-US" dirty="0" smtClean="0"/>
+              <a:t>Linux</a:t>
+            </a:r>
+            <a:endParaRPr lang="en-US" dirty="0"/>
+          </a:p>
+        </p:txBody>
+      </p:sp>
+      <p:sp>
+        <p:nvSpPr>
+          <p:cNvPr id="3" name="Content Placeholder 2"/>
+          <p:cNvSpPr>
+            <a:spLocks noGrp="1"/>
+          </p:cNvSpPr>
+          <p:nvPr>
+            <p:ph idx="1"/>
+          </p:nvPr>
+        </p:nvSpPr>
+        <p:spPr/>
+        <p:txBody>
           <a:bodyPr>
-            <a:normAutofit/>
+            <a:normAutofit fontScale="92500"/>
           </a:bodyPr>
           <a:lstStyle/>
           <a:p>
             <a:r>
               <a:rPr lang="en-US" dirty="0" smtClean="0"/>
-              <a:t>Linux</a:t>
-            </a:r>
-            <a:endParaRPr lang="en-US" dirty="0"/>
-          </a:p>
-        </p:txBody>
-      </p:sp>
-      <p:sp>
-        <p:nvSpPr>
-          <p:cNvPr id="3" name="Content Placeholder 2"/>
-          <p:cNvSpPr>
-            <a:spLocks noGrp="1"/>
-          </p:cNvSpPr>
-          <p:nvPr>
-            <p:ph idx="1"/>
-          </p:nvPr>
-        </p:nvSpPr>
-        <p:spPr/>
-        <p:txBody>
-          <a:bodyPr>
-            <a:normAutofit lnSpcReduction="10000"/>
-          </a:bodyPr>
-          <a:lstStyle/>
-          <a:p>
-            <a:r>
-              <a:rPr lang="en-US" dirty="0" smtClean="0"/>
-              <a:t>History</a:t>
-            </a:r>
-          </a:p>
-          <a:p>
-            <a:pPr lvl="1"/>
-            <a:r>
-              <a:rPr lang="en-US" dirty="0" smtClean="0"/>
-              <a:t>Started by Linus Torvalds in 1991</a:t>
-            </a:r>
-          </a:p>
-          <a:p>
-            <a:pPr lvl="1"/>
-            <a:r>
-              <a:rPr lang="en-US" dirty="0" smtClean="0"/>
-              <a:t>Inspired by Unix, developed at AT&amp;T in 1970s</a:t>
-            </a:r>
-          </a:p>
-          <a:p>
-            <a:pPr lvl="1"/>
-            <a:r>
-              <a:rPr lang="en-US" dirty="0" smtClean="0"/>
-              <a:t>Linux is not Unix, but uses same concepts</a:t>
-            </a:r>
-          </a:p>
-          <a:p>
-            <a:pPr lvl="1"/>
-            <a:r>
-              <a:rPr lang="en-US" dirty="0" smtClean="0"/>
-              <a:t>Open Source Software (General Public License)</a:t>
-            </a:r>
-          </a:p>
-          <a:p>
-            <a:r>
-              <a:rPr lang="en-US" dirty="0" smtClean="0"/>
-              <a:t>Runs on cells phones to largest supercomputers</a:t>
-            </a:r>
-          </a:p>
-          <a:p>
-            <a:r>
-              <a:rPr lang="en-US" dirty="0" smtClean="0"/>
-              <a:t>Perfect for supporting service-based application architecture in the cloud</a:t>
-            </a:r>
-            <a:endParaRPr lang="en-US" dirty="0"/>
+              <a:t>Why Linux? </a:t>
+            </a:r>
+          </a:p>
+          <a:p>
+            <a:pPr lvl="1"/>
+            <a:r>
+              <a:rPr lang="en-US" dirty="0"/>
+              <a:t>C</a:t>
+            </a:r>
+            <a:r>
+              <a:rPr lang="en-US" dirty="0" smtClean="0"/>
+              <a:t>ommon platform for modern distributed applications</a:t>
+            </a:r>
+          </a:p>
+          <a:p>
+            <a:pPr lvl="1"/>
+            <a:r>
+              <a:rPr lang="en-US" dirty="0" smtClean="0"/>
+              <a:t>Automation starts at the command line, not the GUI</a:t>
+            </a:r>
+          </a:p>
+          <a:p>
+            <a:pPr lvl="1"/>
+            <a:endParaRPr lang="en-US" dirty="0" smtClean="0"/>
+          </a:p>
+          <a:p>
+            <a:r>
+              <a:rPr lang="en-US" dirty="0" smtClean="0"/>
+              <a:t>Caveat: It’s not possible to learn Linux in a few hours. </a:t>
+            </a:r>
+          </a:p>
+          <a:p>
+            <a:pPr lvl="1"/>
+            <a:r>
+              <a:rPr lang="en-US" dirty="0" smtClean="0"/>
+              <a:t>Plan to invest meaningful time outside of class if you aren’t already familiar with it. </a:t>
+            </a:r>
+          </a:p>
+          <a:p>
+            <a:endParaRPr lang="en-US" dirty="0" smtClean="0"/>
+          </a:p>
+          <a:p>
+            <a:endParaRPr lang="en-US" dirty="0" smtClean="0"/>
+          </a:p>
+          <a:p>
+            <a:pPr lvl="1"/>
+            <a:endParaRPr lang="en-US" dirty="0" smtClean="0"/>
           </a:p>
         </p:txBody>
       </p:sp>
     </p:spTree>
     <p:extLst>
       <p:ext uri="{BB962C8B-B14F-4D97-AF65-F5344CB8AC3E}">
-        <p14:creationId xmlns:p14="http://schemas.microsoft.com/office/powerpoint/2010/main" val="3312454313"/>
+        <p14:creationId xmlns:p14="http://schemas.microsoft.com/office/powerpoint/2010/main" val="3727470488"/>
       </p:ext>
     </p:extLst>
   </p:cSld>

</xml_diff>